<commit_message>
Update July 2020 ppts
</commit_message>
<xml_diff>
--- a/2020/7月.pptx
+++ b/2020/7月.pptx
@@ -8,8 +8,6 @@
     <p:sldId id="257" r:id="rId2"/>
     <p:sldId id="258" r:id="rId3"/>
     <p:sldId id="259" r:id="rId4"/>
-    <p:sldId id="260" r:id="rId5"/>
-    <p:sldId id="261" r:id="rId6"/>
   </p:sldIdLst>
   <p:sldSz cx="12192000" cy="6858000"/>
   <p:notesSz cx="6858000" cy="9144000"/>
@@ -108,6 +106,11 @@
       </a:defRPr>
     </a:lvl9pPr>
   </p:defaultTextStyle>
+  <p:extLst>
+    <p:ext uri="{EFAFB233-063F-42B5-8137-9DF3F51BA10A}">
+      <p15:sldGuideLst xmlns:p15="http://schemas.microsoft.com/office/powerpoint/2012/main"/>
+    </p:ext>
+  </p:extLst>
 </p:presentation>
 </file>
 
@@ -242,7 +245,7 @@
           <a:p>
             <a:fld id="{A602E18F-600C-499B-80FE-D6CBF6AADD53}" type="datetimeFigureOut">
               <a:rPr lang="vi-VN" smtClean="0"/>
-              <a:t>13/06/2020</a:t>
+              <a:t>05/07/2020</a:t>
             </a:fld>
             <a:endParaRPr lang="vi-VN"/>
           </a:p>
@@ -412,7 +415,7 @@
           <a:p>
             <a:fld id="{A602E18F-600C-499B-80FE-D6CBF6AADD53}" type="datetimeFigureOut">
               <a:rPr lang="vi-VN" smtClean="0"/>
-              <a:t>13/06/2020</a:t>
+              <a:t>05/07/2020</a:t>
             </a:fld>
             <a:endParaRPr lang="vi-VN"/>
           </a:p>
@@ -592,7 +595,7 @@
           <a:p>
             <a:fld id="{A602E18F-600C-499B-80FE-D6CBF6AADD53}" type="datetimeFigureOut">
               <a:rPr lang="vi-VN" smtClean="0"/>
-              <a:t>13/06/2020</a:t>
+              <a:t>05/07/2020</a:t>
             </a:fld>
             <a:endParaRPr lang="vi-VN"/>
           </a:p>
@@ -762,7 +765,7 @@
           <a:p>
             <a:fld id="{A602E18F-600C-499B-80FE-D6CBF6AADD53}" type="datetimeFigureOut">
               <a:rPr lang="vi-VN" smtClean="0"/>
-              <a:t>13/06/2020</a:t>
+              <a:t>05/07/2020</a:t>
             </a:fld>
             <a:endParaRPr lang="vi-VN"/>
           </a:p>
@@ -1008,7 +1011,7 @@
           <a:p>
             <a:fld id="{A602E18F-600C-499B-80FE-D6CBF6AADD53}" type="datetimeFigureOut">
               <a:rPr lang="vi-VN" smtClean="0"/>
-              <a:t>13/06/2020</a:t>
+              <a:t>05/07/2020</a:t>
             </a:fld>
             <a:endParaRPr lang="vi-VN"/>
           </a:p>
@@ -1240,7 +1243,7 @@
           <a:p>
             <a:fld id="{A602E18F-600C-499B-80FE-D6CBF6AADD53}" type="datetimeFigureOut">
               <a:rPr lang="vi-VN" smtClean="0"/>
-              <a:t>13/06/2020</a:t>
+              <a:t>05/07/2020</a:t>
             </a:fld>
             <a:endParaRPr lang="vi-VN"/>
           </a:p>
@@ -1607,7 +1610,7 @@
           <a:p>
             <a:fld id="{A602E18F-600C-499B-80FE-D6CBF6AADD53}" type="datetimeFigureOut">
               <a:rPr lang="vi-VN" smtClean="0"/>
-              <a:t>13/06/2020</a:t>
+              <a:t>05/07/2020</a:t>
             </a:fld>
             <a:endParaRPr lang="vi-VN"/>
           </a:p>
@@ -1725,7 +1728,7 @@
           <a:p>
             <a:fld id="{A602E18F-600C-499B-80FE-D6CBF6AADD53}" type="datetimeFigureOut">
               <a:rPr lang="vi-VN" smtClean="0"/>
-              <a:t>13/06/2020</a:t>
+              <a:t>05/07/2020</a:t>
             </a:fld>
             <a:endParaRPr lang="vi-VN"/>
           </a:p>
@@ -1820,7 +1823,7 @@
           <a:p>
             <a:fld id="{A602E18F-600C-499B-80FE-D6CBF6AADD53}" type="datetimeFigureOut">
               <a:rPr lang="vi-VN" smtClean="0"/>
-              <a:t>13/06/2020</a:t>
+              <a:t>05/07/2020</a:t>
             </a:fld>
             <a:endParaRPr lang="vi-VN"/>
           </a:p>
@@ -2097,7 +2100,7 @@
           <a:p>
             <a:fld id="{A602E18F-600C-499B-80FE-D6CBF6AADD53}" type="datetimeFigureOut">
               <a:rPr lang="vi-VN" smtClean="0"/>
-              <a:t>13/06/2020</a:t>
+              <a:t>05/07/2020</a:t>
             </a:fld>
             <a:endParaRPr lang="vi-VN"/>
           </a:p>
@@ -2350,7 +2353,7 @@
           <a:p>
             <a:fld id="{A602E18F-600C-499B-80FE-D6CBF6AADD53}" type="datetimeFigureOut">
               <a:rPr lang="vi-VN" smtClean="0"/>
-              <a:t>13/06/2020</a:t>
+              <a:t>05/07/2020</a:t>
             </a:fld>
             <a:endParaRPr lang="vi-VN"/>
           </a:p>
@@ -2563,7 +2566,7 @@
           <a:p>
             <a:fld id="{A602E18F-600C-499B-80FE-D6CBF6AADD53}" type="datetimeFigureOut">
               <a:rPr lang="vi-VN" smtClean="0"/>
-              <a:t>13/06/2020</a:t>
+              <a:t>05/07/2020</a:t>
             </a:fld>
             <a:endParaRPr lang="vi-VN"/>
           </a:p>
@@ -3236,196 +3239,6 @@
 </p:sld>
 </file>
 
-<file path=ppt/slides/slide4.xml><?xml version="1.0" encoding="utf-8"?>
-<p:sld xmlns:a="http://schemas.openxmlformats.org/drawingml/2006/main" xmlns:r="http://schemas.openxmlformats.org/officeDocument/2006/relationships" xmlns:p="http://schemas.openxmlformats.org/presentationml/2006/main">
-  <p:cSld>
-    <p:spTree>
-      <p:nvGrpSpPr>
-        <p:cNvPr id="1" name=""/>
-        <p:cNvGrpSpPr/>
-        <p:nvPr/>
-      </p:nvGrpSpPr>
-      <p:grpSpPr>
-        <a:xfrm>
-          <a:off x="0" y="0"/>
-          <a:ext cx="0" cy="0"/>
-          <a:chOff x="0" y="0"/>
-          <a:chExt cx="0" cy="0"/>
-        </a:xfrm>
-      </p:grpSpPr>
-      <p:pic>
-        <p:nvPicPr>
-          <p:cNvPr id="5122" name="Picture 1" descr="CPW05_editable_16x9.035.jpeg"/>
-          <p:cNvPicPr>
-            <a:picLocks noChangeAspect="1"/>
-          </p:cNvPicPr>
-          <p:nvPr/>
-        </p:nvPicPr>
-        <p:blipFill>
-          <a:blip r:embed="rId2">
-            <a:extLst>
-              <a:ext uri="{28A0092B-C50C-407E-A947-70E740481C1C}">
-                <a14:useLocalDpi xmlns:a14="http://schemas.microsoft.com/office/drawing/2010/main" val="0"/>
-              </a:ext>
-            </a:extLst>
-          </a:blip>
-          <a:srcRect/>
-          <a:stretch>
-            <a:fillRect/>
-          </a:stretch>
-        </p:blipFill>
-        <p:spPr bwMode="auto">
-          <a:xfrm>
-            <a:off x="0" y="0"/>
-            <a:ext cx="12192000" cy="6858000"/>
-          </a:xfrm>
-          <a:prstGeom prst="rect">
-            <a:avLst/>
-          </a:prstGeom>
-          <a:noFill/>
-          <a:ln>
-            <a:noFill/>
-          </a:ln>
-          <a:effectLst/>
-          <a:extLst>
-            <a:ext uri="{909E8E84-426E-40DD-AFC4-6F175D3DCCD1}">
-              <a14:hiddenFill xmlns:a14="http://schemas.microsoft.com/office/drawing/2010/main">
-                <a:solidFill>
-                  <a:srgbClr val="FFFFFF"/>
-                </a:solidFill>
-              </a14:hiddenFill>
-            </a:ext>
-            <a:ext uri="{91240B29-F687-4F45-9708-019B960494DF}">
-              <a14:hiddenLine xmlns:a14="http://schemas.microsoft.com/office/drawing/2010/main" w="12700">
-                <a:solidFill>
-                  <a:srgbClr val="000000"/>
-                </a:solidFill>
-                <a:miter lim="400000"/>
-                <a:headEnd/>
-                <a:tailEnd/>
-              </a14:hiddenLine>
-            </a:ext>
-            <a:ext uri="{AF507438-7753-43E0-B8FC-AC1667EBCBE1}">
-              <a14:hiddenEffects xmlns:a14="http://schemas.microsoft.com/office/drawing/2010/main">
-                <a:effectLst>
-                  <a:outerShdw dist="35921" dir="2700000" algn="ctr" rotWithShape="0">
-                    <a:srgbClr val="808080"/>
-                  </a:outerShdw>
-                </a:effectLst>
-              </a14:hiddenEffects>
-            </a:ext>
-          </a:extLst>
-        </p:spPr>
-      </p:pic>
-    </p:spTree>
-    <p:extLst>
-      <p:ext uri="{BB962C8B-B14F-4D97-AF65-F5344CB8AC3E}">
-        <p14:creationId xmlns:p14="http://schemas.microsoft.com/office/powerpoint/2010/main" val="3476940065"/>
-      </p:ext>
-    </p:extLst>
-  </p:cSld>
-  <p:clrMapOvr>
-    <a:masterClrMapping/>
-  </p:clrMapOvr>
-  <p:transition spd="med"/>
-</p:sld>
-</file>
-
-<file path=ppt/slides/slide5.xml><?xml version="1.0" encoding="utf-8"?>
-<p:sld xmlns:a="http://schemas.openxmlformats.org/drawingml/2006/main" xmlns:r="http://schemas.openxmlformats.org/officeDocument/2006/relationships" xmlns:p="http://schemas.openxmlformats.org/presentationml/2006/main">
-  <p:cSld>
-    <p:spTree>
-      <p:nvGrpSpPr>
-        <p:cNvPr id="1" name=""/>
-        <p:cNvGrpSpPr/>
-        <p:nvPr/>
-      </p:nvGrpSpPr>
-      <p:grpSpPr>
-        <a:xfrm>
-          <a:off x="0" y="0"/>
-          <a:ext cx="0" cy="0"/>
-          <a:chOff x="0" y="0"/>
-          <a:chExt cx="0" cy="0"/>
-        </a:xfrm>
-      </p:grpSpPr>
-      <p:pic>
-        <p:nvPicPr>
-          <p:cNvPr id="6146" name="Picture 1" descr="CPW05_editable_16x9.036.jpeg"/>
-          <p:cNvPicPr>
-            <a:picLocks noChangeAspect="1"/>
-          </p:cNvPicPr>
-          <p:nvPr/>
-        </p:nvPicPr>
-        <p:blipFill>
-          <a:blip r:embed="rId2">
-            <a:extLst>
-              <a:ext uri="{28A0092B-C50C-407E-A947-70E740481C1C}">
-                <a14:useLocalDpi xmlns:a14="http://schemas.microsoft.com/office/drawing/2010/main" val="0"/>
-              </a:ext>
-            </a:extLst>
-          </a:blip>
-          <a:srcRect/>
-          <a:stretch>
-            <a:fillRect/>
-          </a:stretch>
-        </p:blipFill>
-        <p:spPr bwMode="auto">
-          <a:xfrm>
-            <a:off x="0" y="0"/>
-            <a:ext cx="12192000" cy="6858000"/>
-          </a:xfrm>
-          <a:prstGeom prst="rect">
-            <a:avLst/>
-          </a:prstGeom>
-          <a:noFill/>
-          <a:ln>
-            <a:noFill/>
-          </a:ln>
-          <a:effectLst/>
-          <a:extLst>
-            <a:ext uri="{909E8E84-426E-40DD-AFC4-6F175D3DCCD1}">
-              <a14:hiddenFill xmlns:a14="http://schemas.microsoft.com/office/drawing/2010/main">
-                <a:solidFill>
-                  <a:srgbClr val="FFFFFF"/>
-                </a:solidFill>
-              </a14:hiddenFill>
-            </a:ext>
-            <a:ext uri="{91240B29-F687-4F45-9708-019B960494DF}">
-              <a14:hiddenLine xmlns:a14="http://schemas.microsoft.com/office/drawing/2010/main" w="12700">
-                <a:solidFill>
-                  <a:srgbClr val="000000"/>
-                </a:solidFill>
-                <a:miter lim="400000"/>
-                <a:headEnd/>
-                <a:tailEnd/>
-              </a14:hiddenLine>
-            </a:ext>
-            <a:ext uri="{AF507438-7753-43E0-B8FC-AC1667EBCBE1}">
-              <a14:hiddenEffects xmlns:a14="http://schemas.microsoft.com/office/drawing/2010/main">
-                <a:effectLst>
-                  <a:outerShdw dist="35921" dir="2700000" algn="ctr" rotWithShape="0">
-                    <a:srgbClr val="808080"/>
-                  </a:outerShdw>
-                </a:effectLst>
-              </a14:hiddenEffects>
-            </a:ext>
-          </a:extLst>
-        </p:spPr>
-      </p:pic>
-    </p:spTree>
-    <p:extLst>
-      <p:ext uri="{BB962C8B-B14F-4D97-AF65-F5344CB8AC3E}">
-        <p14:creationId xmlns:p14="http://schemas.microsoft.com/office/powerpoint/2010/main" val="21897731"/>
-      </p:ext>
-    </p:extLst>
-  </p:cSld>
-  <p:clrMapOvr>
-    <a:masterClrMapping/>
-  </p:clrMapOvr>
-  <p:transition spd="med"/>
-</p:sld>
-</file>
-
 <file path=ppt/theme/theme1.xml><?xml version="1.0" encoding="utf-8"?>
 <a:theme xmlns:a="http://schemas.openxmlformats.org/drawingml/2006/main" name="Office Theme">
   <a:themeElements>

</xml_diff>